<commit_message>
Add C posix threads example
</commit_message>
<xml_diff>
--- a/Лекции/ПиАСИ лек 7 Си.pptx
+++ b/Лекции/ПиАСИ лек 7 Си.pptx
@@ -270,7 +270,7 @@
             <a:fld id="{AA2F9473-F066-431E-A6E8-1D478C995A6B}" type="datetimeFigureOut">
               <a:rPr lang="en-US" smtClean="0"/>
               <a:pPr/>
-              <a:t>4/13/2025</a:t>
+              <a:t>4/16/2025</a:t>
             </a:fld>
             <a:endParaRPr lang="en-US"/>
           </a:p>
@@ -40458,7 +40458,7 @@
         <p:spPr>
           <a:xfrm>
             <a:off x="292099" y="0"/>
-            <a:ext cx="11569701" cy="4708981"/>
+            <a:ext cx="11569701" cy="5015668"/>
           </a:xfrm>
           <a:prstGeom prst="rect">
             <a:avLst/>
@@ -40470,8 +40470,19 @@
           </a:bodyPr>
           <a:lstStyle/>
           <a:p>
-            <a:r>
-              <a:rPr lang="en-US" sz="2400" dirty="0" err="1">
+            <a:endParaRPr lang="ru-RU" sz="2400" dirty="0" smtClean="0">
+              <a:solidFill>
+                <a:srgbClr val="0000FF"/>
+              </a:solidFill>
+              <a:highlight>
+                <a:srgbClr val="FFFFFF"/>
+              </a:highlight>
+              <a:latin typeface="Cascadia Mono" panose="020B0609020000020004" pitchFamily="49" charset="0"/>
+            </a:endParaRPr>
+          </a:p>
+          <a:p>
+            <a:r>
+              <a:rPr lang="en-US" sz="2400" dirty="0" err="1" smtClean="0">
                 <a:solidFill>
                   <a:srgbClr val="0000FF"/>
                 </a:solidFill>
@@ -40483,7 +40494,7 @@
               <a:t>int</a:t>
             </a:r>
             <a:r>
-              <a:rPr lang="en-US" sz="2400" dirty="0">
+              <a:rPr lang="en-US" sz="2400" dirty="0" smtClean="0">
                 <a:solidFill>
                   <a:srgbClr val="000000"/>
                 </a:solidFill>
@@ -41960,12 +41971,33 @@
                 </a:highlight>
                 <a:latin typeface="Cascadia Mono" panose="020B0609020000020004" pitchFamily="49" charset="0"/>
               </a:rPr>
-              <a:t>    {</a:t>
-            </a:r>
-          </a:p>
-          <a:p>
-            <a:r>
-              <a:rPr lang="en-US" sz="2400" dirty="0">
+              <a:t>    </a:t>
+            </a:r>
+            <a:r>
+              <a:rPr lang="ru-RU" sz="2400" dirty="0" smtClean="0">
+                <a:solidFill>
+                  <a:srgbClr val="000000"/>
+                </a:solidFill>
+                <a:highlight>
+                  <a:srgbClr val="FFFFFF"/>
+                </a:highlight>
+                <a:latin typeface="Cascadia Mono" panose="020B0609020000020004" pitchFamily="49" charset="0"/>
+              </a:rPr>
+              <a:t>{</a:t>
+            </a:r>
+            <a:endParaRPr lang="ru-RU" sz="2400" dirty="0">
+              <a:solidFill>
+                <a:srgbClr val="000000"/>
+              </a:solidFill>
+              <a:highlight>
+                <a:srgbClr val="FFFFFF"/>
+              </a:highlight>
+              <a:latin typeface="Cascadia Mono" panose="020B0609020000020004" pitchFamily="49" charset="0"/>
+            </a:endParaRPr>
+          </a:p>
+          <a:p>
+            <a:r>
+              <a:rPr lang="en-US" sz="2400" dirty="0" smtClean="0">
                 <a:solidFill>
                   <a:srgbClr val="000000"/>
                 </a:solidFill>
@@ -41977,7 +42009,7 @@
               <a:t>        puts(</a:t>
             </a:r>
             <a:r>
-              <a:rPr lang="en-US" sz="2400" dirty="0" err="1">
+              <a:rPr lang="en-US" sz="2400" dirty="0" err="1" smtClean="0">
                 <a:solidFill>
                   <a:srgbClr val="808080"/>
                 </a:solidFill>
@@ -41989,7 +42021,7 @@
               <a:t>arg</a:t>
             </a:r>
             <a:r>
-              <a:rPr lang="en-US" sz="2400" dirty="0">
+              <a:rPr lang="en-US" sz="2400" dirty="0" smtClean="0">
                 <a:solidFill>
                   <a:srgbClr val="000000"/>
                 </a:solidFill>
@@ -42000,6 +42032,15 @@
               </a:rPr>
               <a:t>);</a:t>
             </a:r>
+            <a:endParaRPr lang="en-US" sz="2400" dirty="0">
+              <a:solidFill>
+                <a:srgbClr val="000000"/>
+              </a:solidFill>
+              <a:highlight>
+                <a:srgbClr val="FFFFFF"/>
+              </a:highlight>
+              <a:latin typeface="Cascadia Mono" panose="020B0609020000020004" pitchFamily="49" charset="0"/>
+            </a:endParaRPr>
           </a:p>
           <a:p>
             <a:r>
@@ -42740,6 +42781,29 @@
           </a:p>
         </p:txBody>
       </p:sp>
+      <p:pic>
+        <p:nvPicPr>
+          <p:cNvPr id="2" name="Рисунок 1"/>
+          <p:cNvPicPr>
+            <a:picLocks noChangeAspect="1"/>
+          </p:cNvPicPr>
+          <p:nvPr/>
+        </p:nvPicPr>
+        <p:blipFill rotWithShape="1">
+          <a:blip r:embed="rId3"/>
+          <a:srcRect b="7478"/>
+          <a:stretch/>
+        </p:blipFill>
+        <p:spPr>
+          <a:xfrm>
+            <a:off x="4610637" y="2340812"/>
+            <a:ext cx="7148069" cy="4317565"/>
+          </a:xfrm>
+          <a:prstGeom prst="rect">
+            <a:avLst/>
+          </a:prstGeom>
+        </p:spPr>
+      </p:pic>
     </p:spTree>
     <p:extLst>
       <p:ext uri="{BB962C8B-B14F-4D97-AF65-F5344CB8AC3E}">

</xml_diff>